<commit_message>
Test data for the alloknesis protocol
</commit_message>
<xml_diff>
--- a/docs/alloknesisDemo/Images.pptx
+++ b/docs/alloknesisDemo/Images.pptx
@@ -262,7 +262,7 @@
           <a:p>
             <a:fld id="{D2A49CF2-2BB9-4EA3-B855-525C04DCAA37}" type="datetimeFigureOut">
               <a:rPr lang="en-DK" smtClean="0"/>
-              <a:t>04/19/2024</a:t>
+              <a:t>19/04/2024</a:t>
             </a:fld>
             <a:endParaRPr lang="en-DK"/>
           </a:p>
@@ -462,7 +462,7 @@
           <a:p>
             <a:fld id="{D2A49CF2-2BB9-4EA3-B855-525C04DCAA37}" type="datetimeFigureOut">
               <a:rPr lang="en-DK" smtClean="0"/>
-              <a:t>04/19/2024</a:t>
+              <a:t>19/04/2024</a:t>
             </a:fld>
             <a:endParaRPr lang="en-DK"/>
           </a:p>
@@ -672,7 +672,7 @@
           <a:p>
             <a:fld id="{D2A49CF2-2BB9-4EA3-B855-525C04DCAA37}" type="datetimeFigureOut">
               <a:rPr lang="en-DK" smtClean="0"/>
-              <a:t>04/19/2024</a:t>
+              <a:t>19/04/2024</a:t>
             </a:fld>
             <a:endParaRPr lang="en-DK"/>
           </a:p>
@@ -872,7 +872,7 @@
           <a:p>
             <a:fld id="{D2A49CF2-2BB9-4EA3-B855-525C04DCAA37}" type="datetimeFigureOut">
               <a:rPr lang="en-DK" smtClean="0"/>
-              <a:t>04/19/2024</a:t>
+              <a:t>19/04/2024</a:t>
             </a:fld>
             <a:endParaRPr lang="en-DK"/>
           </a:p>
@@ -1148,7 +1148,7 @@
           <a:p>
             <a:fld id="{D2A49CF2-2BB9-4EA3-B855-525C04DCAA37}" type="datetimeFigureOut">
               <a:rPr lang="en-DK" smtClean="0"/>
-              <a:t>04/19/2024</a:t>
+              <a:t>19/04/2024</a:t>
             </a:fld>
             <a:endParaRPr lang="en-DK"/>
           </a:p>
@@ -1416,7 +1416,7 @@
           <a:p>
             <a:fld id="{D2A49CF2-2BB9-4EA3-B855-525C04DCAA37}" type="datetimeFigureOut">
               <a:rPr lang="en-DK" smtClean="0"/>
-              <a:t>04/19/2024</a:t>
+              <a:t>19/04/2024</a:t>
             </a:fld>
             <a:endParaRPr lang="en-DK"/>
           </a:p>
@@ -1831,7 +1831,7 @@
           <a:p>
             <a:fld id="{D2A49CF2-2BB9-4EA3-B855-525C04DCAA37}" type="datetimeFigureOut">
               <a:rPr lang="en-DK" smtClean="0"/>
-              <a:t>04/19/2024</a:t>
+              <a:t>19/04/2024</a:t>
             </a:fld>
             <a:endParaRPr lang="en-DK"/>
           </a:p>
@@ -1973,7 +1973,7 @@
           <a:p>
             <a:fld id="{D2A49CF2-2BB9-4EA3-B855-525C04DCAA37}" type="datetimeFigureOut">
               <a:rPr lang="en-DK" smtClean="0"/>
-              <a:t>04/19/2024</a:t>
+              <a:t>19/04/2024</a:t>
             </a:fld>
             <a:endParaRPr lang="en-DK"/>
           </a:p>
@@ -2086,7 +2086,7 @@
           <a:p>
             <a:fld id="{D2A49CF2-2BB9-4EA3-B855-525C04DCAA37}" type="datetimeFigureOut">
               <a:rPr lang="en-DK" smtClean="0"/>
-              <a:t>04/19/2024</a:t>
+              <a:t>19/04/2024</a:t>
             </a:fld>
             <a:endParaRPr lang="en-DK"/>
           </a:p>
@@ -2399,7 +2399,7 @@
           <a:p>
             <a:fld id="{D2A49CF2-2BB9-4EA3-B855-525C04DCAA37}" type="datetimeFigureOut">
               <a:rPr lang="en-DK" smtClean="0"/>
-              <a:t>04/19/2024</a:t>
+              <a:t>19/04/2024</a:t>
             </a:fld>
             <a:endParaRPr lang="en-DK"/>
           </a:p>
@@ -2688,7 +2688,7 @@
           <a:p>
             <a:fld id="{D2A49CF2-2BB9-4EA3-B855-525C04DCAA37}" type="datetimeFigureOut">
               <a:rPr lang="en-DK" smtClean="0"/>
-              <a:t>04/19/2024</a:t>
+              <a:t>19/04/2024</a:t>
             </a:fld>
             <a:endParaRPr lang="en-DK"/>
           </a:p>
@@ -2931,7 +2931,7 @@
           <a:p>
             <a:fld id="{D2A49CF2-2BB9-4EA3-B855-525C04DCAA37}" type="datetimeFigureOut">
               <a:rPr lang="en-DK" smtClean="0"/>
-              <a:t>04/19/2024</a:t>
+              <a:t>19/04/2024</a:t>
             </a:fld>
             <a:endParaRPr lang="en-DK"/>
           </a:p>
@@ -3362,8 +3362,8 @@
         </p:nvSpPr>
         <p:spPr>
           <a:xfrm>
-            <a:off x="578841" y="3930716"/>
-            <a:ext cx="10895000" cy="707886"/>
+            <a:off x="648500" y="4615364"/>
+            <a:ext cx="10895000" cy="1384995"/>
           </a:xfrm>
           <a:prstGeom prst="rect">
             <a:avLst/>
@@ -3376,9 +3376,9 @@
           </a:bodyPr>
           <a:lstStyle/>
           <a:p>
-            <a:pPr algn="ctr"/>
-            <a:r>
-              <a:rPr lang="en-US" sz="2000" dirty="0">
+            <a:pPr algn="just"/>
+            <a:r>
+              <a:rPr lang="en-US" sz="2800" dirty="0">
                 <a:latin typeface="Calibri" panose="020F0502020204030204" pitchFamily="34" charset="0"/>
                 <a:cs typeface="Calibri" panose="020F0502020204030204" pitchFamily="34" charset="0"/>
               </a:rPr>
@@ -3387,427 +3387,355 @@
           </a:p>
         </p:txBody>
       </p:sp>
-      <p:grpSp>
-        <p:nvGrpSpPr>
-          <p:cNvPr id="30" name="Group 29">
-            <a:extLst>
-              <a:ext uri="{FF2B5EF4-FFF2-40B4-BE49-F238E27FC236}">
-                <a16:creationId xmlns:a16="http://schemas.microsoft.com/office/drawing/2014/main" id="{A31BDF2E-98B7-1568-2523-F349E82A3AFF}"/>
-              </a:ext>
-            </a:extLst>
-          </p:cNvPr>
-          <p:cNvGrpSpPr/>
+      <p:sp>
+        <p:nvSpPr>
+          <p:cNvPr id="17" name="TextBox 16">
+            <a:extLst>
+              <a:ext uri="{FF2B5EF4-FFF2-40B4-BE49-F238E27FC236}">
+                <a16:creationId xmlns:a16="http://schemas.microsoft.com/office/drawing/2014/main" id="{0F394F86-7D5D-B2F2-A4D7-651DD9EA347A}"/>
+              </a:ext>
+            </a:extLst>
+          </p:cNvPr>
+          <p:cNvSpPr txBox="1"/>
           <p:nvPr/>
-        </p:nvGrpSpPr>
-        <p:grpSpPr>
+        </p:nvSpPr>
+        <p:spPr>
           <a:xfrm>
-            <a:off x="115769" y="424341"/>
-            <a:ext cx="11516058" cy="2673087"/>
-            <a:chOff x="115769" y="424341"/>
-            <a:chExt cx="11516058" cy="2673087"/>
+            <a:off x="1646915" y="3083634"/>
+            <a:ext cx="4780389" cy="369332"/>
           </a:xfrm>
-        </p:grpSpPr>
-        <p:sp>
-          <p:nvSpPr>
-            <p:cNvPr id="17" name="TextBox 16">
-              <a:extLst>
-                <a:ext uri="{FF2B5EF4-FFF2-40B4-BE49-F238E27FC236}">
-                  <a16:creationId xmlns:a16="http://schemas.microsoft.com/office/drawing/2014/main" id="{0F394F86-7D5D-B2F2-A4D7-651DD9EA347A}"/>
-                </a:ext>
-              </a:extLst>
-            </p:cNvPr>
-            <p:cNvSpPr txBox="1"/>
-            <p:nvPr/>
-          </p:nvSpPr>
-          <p:spPr>
-            <a:xfrm>
-              <a:off x="2000482" y="2729890"/>
-              <a:ext cx="3073549" cy="276999"/>
-            </a:xfrm>
-            <a:prstGeom prst="rect">
-              <a:avLst/>
-            </a:prstGeom>
-            <a:noFill/>
-          </p:spPr>
-          <p:txBody>
-            <a:bodyPr wrap="square" rtlCol="0">
-              <a:spAutoFit/>
-            </a:bodyPr>
-            <a:lstStyle/>
-            <a:p>
-              <a:pPr algn="ctr"/>
-              <a:r>
-                <a:rPr lang="da-DK" sz="1200" dirty="0"/>
-                <a:t>Rating </a:t>
-              </a:r>
-              <a:r>
-                <a:rPr lang="da-DK" sz="1200" dirty="0" err="1"/>
-                <a:t>scale</a:t>
-              </a:r>
-              <a:r>
-                <a:rPr lang="da-DK" sz="1200" dirty="0"/>
-                <a:t> </a:t>
-              </a:r>
-              <a:r>
-                <a:rPr lang="da-DK" sz="1200" dirty="0" err="1"/>
-                <a:t>you</a:t>
-              </a:r>
-              <a:r>
-                <a:rPr lang="da-DK" sz="1200" dirty="0"/>
-                <a:t> will </a:t>
-              </a:r>
-              <a:r>
-                <a:rPr lang="da-DK" sz="1200" dirty="0" err="1"/>
-                <a:t>see</a:t>
-              </a:r>
-              <a:r>
-                <a:rPr lang="da-DK" sz="1200" dirty="0"/>
-                <a:t> </a:t>
-              </a:r>
-              <a:r>
-                <a:rPr lang="da-DK" sz="1200" dirty="0" err="1"/>
-                <a:t>during</a:t>
-              </a:r>
-              <a:r>
-                <a:rPr lang="da-DK" sz="1200" dirty="0"/>
-                <a:t> the rating</a:t>
-              </a:r>
-              <a:endParaRPr lang="en-US" sz="1200" dirty="0"/>
-            </a:p>
-          </p:txBody>
-        </p:sp>
-        <p:grpSp>
-          <p:nvGrpSpPr>
-            <p:cNvPr id="24" name="Group 23">
-              <a:extLst>
-                <a:ext uri="{FF2B5EF4-FFF2-40B4-BE49-F238E27FC236}">
-                  <a16:creationId xmlns:a16="http://schemas.microsoft.com/office/drawing/2014/main" id="{8FB86AAC-781A-F164-9E55-73628B948587}"/>
-                </a:ext>
-              </a:extLst>
-            </p:cNvPr>
-            <p:cNvGrpSpPr/>
-            <p:nvPr/>
-          </p:nvGrpSpPr>
-          <p:grpSpPr>
-            <a:xfrm>
-              <a:off x="8157608" y="424341"/>
-              <a:ext cx="3474219" cy="2673087"/>
-              <a:chOff x="1279244" y="871414"/>
-              <a:chExt cx="4210638" cy="3357669"/>
-            </a:xfrm>
-          </p:grpSpPr>
-          <p:pic>
-            <p:nvPicPr>
-              <p:cNvPr id="19" name="Picture 18">
-                <a:extLst>
-                  <a:ext uri="{FF2B5EF4-FFF2-40B4-BE49-F238E27FC236}">
-                    <a16:creationId xmlns:a16="http://schemas.microsoft.com/office/drawing/2014/main" id="{E7E0EAEB-5853-4612-8A5B-86596A0DE654}"/>
-                  </a:ext>
-                </a:extLst>
-              </p:cNvPr>
-              <p:cNvPicPr>
-                <a:picLocks noChangeAspect="1"/>
-              </p:cNvPicPr>
-              <p:nvPr/>
-            </p:nvPicPr>
-            <p:blipFill>
-              <a:blip r:embed="rId2"/>
-              <a:stretch>
-                <a:fillRect/>
-              </a:stretch>
-            </p:blipFill>
-            <p:spPr>
-              <a:xfrm>
-                <a:off x="1279244" y="1102247"/>
-                <a:ext cx="4210638" cy="2896004"/>
-              </a:xfrm>
-              <a:prstGeom prst="rect">
-                <a:avLst/>
-              </a:prstGeom>
-            </p:spPr>
-          </p:pic>
-          <p:sp>
-            <p:nvSpPr>
-              <p:cNvPr id="16" name="TextBox 15">
-                <a:extLst>
-                  <a:ext uri="{FF2B5EF4-FFF2-40B4-BE49-F238E27FC236}">
-                    <a16:creationId xmlns:a16="http://schemas.microsoft.com/office/drawing/2014/main" id="{0C50E299-F62F-5799-1C7C-FDCA857E9A62}"/>
-                  </a:ext>
-                </a:extLst>
-              </p:cNvPr>
-              <p:cNvSpPr txBox="1"/>
-              <p:nvPr/>
-            </p:nvSpPr>
-            <p:spPr>
-              <a:xfrm>
-                <a:off x="2068048" y="3767418"/>
-                <a:ext cx="2049137" cy="461665"/>
-              </a:xfrm>
-              <a:prstGeom prst="rect">
-                <a:avLst/>
-              </a:prstGeom>
-              <a:noFill/>
-            </p:spPr>
-            <p:txBody>
-              <a:bodyPr wrap="square" rtlCol="0">
-                <a:spAutoFit/>
-              </a:bodyPr>
-              <a:lstStyle/>
-              <a:p>
-                <a:pPr algn="ctr"/>
-                <a:r>
-                  <a:rPr lang="da-DK" sz="1200" dirty="0" err="1"/>
-                  <a:t>LabBench</a:t>
-                </a:r>
-                <a:r>
-                  <a:rPr lang="da-DK" sz="1200" dirty="0"/>
-                  <a:t> </a:t>
-                </a:r>
-                <a:r>
-                  <a:rPr lang="da-DK" sz="1200" dirty="0" err="1"/>
-                  <a:t>Scale</a:t>
-                </a:r>
-                <a:r>
-                  <a:rPr lang="da-DK" sz="1200" dirty="0"/>
-                  <a:t> </a:t>
-                </a:r>
-                <a:r>
-                  <a:rPr lang="da-DK" sz="1200" dirty="0" err="1"/>
-                  <a:t>you</a:t>
-                </a:r>
-                <a:r>
-                  <a:rPr lang="da-DK" sz="1200" dirty="0"/>
-                  <a:t> will </a:t>
-                </a:r>
-                <a:r>
-                  <a:rPr lang="da-DK" sz="1200" dirty="0" err="1"/>
-                  <a:t>use</a:t>
-                </a:r>
-                <a:r>
-                  <a:rPr lang="da-DK" sz="1200" dirty="0"/>
-                  <a:t> for the ratings.</a:t>
-                </a:r>
-                <a:endParaRPr lang="en-US" sz="1200" dirty="0"/>
-              </a:p>
-            </p:txBody>
-          </p:sp>
-          <p:sp>
-            <p:nvSpPr>
-              <p:cNvPr id="20" name="TextBox 19">
-                <a:extLst>
-                  <a:ext uri="{FF2B5EF4-FFF2-40B4-BE49-F238E27FC236}">
-                    <a16:creationId xmlns:a16="http://schemas.microsoft.com/office/drawing/2014/main" id="{223D1ABB-8D77-3FC5-D0E5-DF62E4F2E04E}"/>
-                  </a:ext>
-                </a:extLst>
-              </p:cNvPr>
-              <p:cNvSpPr txBox="1"/>
-              <p:nvPr/>
-            </p:nvSpPr>
-            <p:spPr>
-              <a:xfrm>
-                <a:off x="3092615" y="871414"/>
-                <a:ext cx="2049136" cy="461665"/>
-              </a:xfrm>
-              <a:prstGeom prst="rect">
-                <a:avLst/>
-              </a:prstGeom>
-              <a:noFill/>
-            </p:spPr>
-            <p:txBody>
-              <a:bodyPr wrap="square" rtlCol="0">
-                <a:spAutoFit/>
-              </a:bodyPr>
-              <a:lstStyle/>
-              <a:p>
-                <a:pPr algn="ctr"/>
-                <a:r>
-                  <a:rPr lang="da-DK" sz="1200" dirty="0" err="1"/>
-                  <a:t>horizontal</a:t>
-                </a:r>
-                <a:r>
-                  <a:rPr lang="da-DK" sz="1200" dirty="0"/>
-                  <a:t> </a:t>
-                </a:r>
-                <a:r>
-                  <a:rPr lang="da-DK" sz="1200" dirty="0" err="1"/>
-                  <a:t>scroll</a:t>
-                </a:r>
-                <a:r>
-                  <a:rPr lang="da-DK" sz="1200" dirty="0"/>
-                  <a:t> bar </a:t>
-                </a:r>
-                <a:r>
-                  <a:rPr lang="da-DK" sz="1200" dirty="0" err="1"/>
-                  <a:t>you</a:t>
-                </a:r>
-                <a:r>
-                  <a:rPr lang="da-DK" sz="1200" dirty="0"/>
-                  <a:t> will </a:t>
-                </a:r>
-                <a:r>
-                  <a:rPr lang="da-DK" sz="1200" dirty="0" err="1"/>
-                  <a:t>use</a:t>
-                </a:r>
-                <a:r>
-                  <a:rPr lang="da-DK" sz="1200" dirty="0"/>
-                  <a:t> for the ratings.</a:t>
-                </a:r>
-                <a:endParaRPr lang="en-US" sz="1200" dirty="0"/>
-              </a:p>
-            </p:txBody>
-          </p:sp>
-          <p:cxnSp>
-            <p:nvCxnSpPr>
-              <p:cNvPr id="22" name="Straight Arrow Connector 21">
-                <a:extLst>
-                  <a:ext uri="{FF2B5EF4-FFF2-40B4-BE49-F238E27FC236}">
-                    <a16:creationId xmlns:a16="http://schemas.microsoft.com/office/drawing/2014/main" id="{D6BF8C15-71FD-1D52-F517-93CBEF1965D9}"/>
-                  </a:ext>
-                </a:extLst>
-              </p:cNvPr>
-              <p:cNvCxnSpPr/>
-              <p:nvPr/>
-            </p:nvCxnSpPr>
-            <p:spPr>
-              <a:xfrm flipH="1">
-                <a:off x="3280095" y="1563912"/>
-                <a:ext cx="394283" cy="611047"/>
-              </a:xfrm>
-              <a:prstGeom prst="straightConnector1">
-                <a:avLst/>
-              </a:prstGeom>
-              <a:ln>
-                <a:tailEnd type="triangle"/>
-              </a:ln>
-            </p:spPr>
-            <p:style>
-              <a:lnRef idx="3">
-                <a:schemeClr val="dk1"/>
-              </a:lnRef>
-              <a:fillRef idx="0">
-                <a:schemeClr val="dk1"/>
-              </a:fillRef>
-              <a:effectRef idx="2">
-                <a:schemeClr val="dk1"/>
-              </a:effectRef>
-              <a:fontRef idx="minor">
-                <a:schemeClr val="tx1"/>
-              </a:fontRef>
-            </p:style>
-          </p:cxnSp>
-        </p:grpSp>
-        <p:pic>
-          <p:nvPicPr>
-            <p:cNvPr id="27" name="Picture 26" descr="A screenshot of a computer&#10;&#10;Description automatically generated">
-              <a:extLst>
-                <a:ext uri="{FF2B5EF4-FFF2-40B4-BE49-F238E27FC236}">
-                  <a16:creationId xmlns:a16="http://schemas.microsoft.com/office/drawing/2014/main" id="{CDC2F8BB-7BAF-B63E-DCF4-AF8763335523}"/>
-                </a:ext>
-              </a:extLst>
-            </p:cNvPr>
-            <p:cNvPicPr>
-              <a:picLocks noChangeAspect="1"/>
-            </p:cNvPicPr>
-            <p:nvPr/>
-          </p:nvPicPr>
-          <p:blipFill rotWithShape="1">
-            <a:blip r:embed="rId3">
-              <a:extLst>
-                <a:ext uri="{28A0092B-C50C-407E-A947-70E740481C1C}">
-                  <a14:useLocalDpi xmlns:a14="http://schemas.microsoft.com/office/drawing/2010/main" val="0"/>
-                </a:ext>
-              </a:extLst>
-            </a:blip>
-            <a:srcRect l="24247" t="43404" r="22997" b="35887"/>
-            <a:stretch/>
-          </p:blipFill>
-          <p:spPr>
-            <a:xfrm>
-              <a:off x="659330" y="1085174"/>
-              <a:ext cx="6120411" cy="1351420"/>
-            </a:xfrm>
-            <a:prstGeom prst="rect">
-              <a:avLst/>
-            </a:prstGeom>
-          </p:spPr>
-        </p:pic>
-        <p:sp>
-          <p:nvSpPr>
-            <p:cNvPr id="28" name="TextBox 27">
-              <a:extLst>
-                <a:ext uri="{FF2B5EF4-FFF2-40B4-BE49-F238E27FC236}">
-                  <a16:creationId xmlns:a16="http://schemas.microsoft.com/office/drawing/2014/main" id="{C6AAA644-E584-FB21-170B-90C28D0AD847}"/>
-                </a:ext>
-              </a:extLst>
-            </p:cNvPr>
-            <p:cNvSpPr txBox="1"/>
-            <p:nvPr/>
-          </p:nvSpPr>
-          <p:spPr>
-            <a:xfrm>
-              <a:off x="115769" y="2024741"/>
-              <a:ext cx="673582" cy="246221"/>
-            </a:xfrm>
-            <a:prstGeom prst="rect">
-              <a:avLst/>
-            </a:prstGeom>
-            <a:noFill/>
-          </p:spPr>
-          <p:txBody>
-            <a:bodyPr wrap="none" rtlCol="0">
-              <a:spAutoFit/>
-            </a:bodyPr>
-            <a:lstStyle/>
-            <a:p>
-              <a:r>
-                <a:rPr lang="en-US" sz="1000" dirty="0">
-                  <a:latin typeface="Calibri" panose="020F0502020204030204" pitchFamily="34" charset="0"/>
-                  <a:cs typeface="Calibri" panose="020F0502020204030204" pitchFamily="34" charset="0"/>
-                </a:rPr>
-                <a:t>0/No itch</a:t>
-              </a:r>
-            </a:p>
-          </p:txBody>
-        </p:sp>
-        <p:sp>
-          <p:nvSpPr>
-            <p:cNvPr id="29" name="TextBox 28">
-              <a:extLst>
-                <a:ext uri="{FF2B5EF4-FFF2-40B4-BE49-F238E27FC236}">
-                  <a16:creationId xmlns:a16="http://schemas.microsoft.com/office/drawing/2014/main" id="{2570535F-EC61-0C4D-4F3F-C2778DB15793}"/>
-                </a:ext>
-              </a:extLst>
-            </p:cNvPr>
-            <p:cNvSpPr txBox="1"/>
-            <p:nvPr/>
-          </p:nvSpPr>
-          <p:spPr>
-            <a:xfrm>
-              <a:off x="6353859" y="2075291"/>
-              <a:ext cx="1564852" cy="246221"/>
-            </a:xfrm>
-            <a:prstGeom prst="rect">
-              <a:avLst/>
-            </a:prstGeom>
-            <a:noFill/>
-          </p:spPr>
-          <p:txBody>
-            <a:bodyPr wrap="none" rtlCol="0">
-              <a:spAutoFit/>
-            </a:bodyPr>
-            <a:lstStyle/>
-            <a:p>
-              <a:r>
-                <a:rPr lang="en-US" sz="1000" dirty="0">
-                  <a:latin typeface="Calibri" panose="020F0502020204030204" pitchFamily="34" charset="0"/>
-                  <a:cs typeface="Calibri" panose="020F0502020204030204" pitchFamily="34" charset="0"/>
-                </a:rPr>
-                <a:t>10/Worst imaginable itch</a:t>
-              </a:r>
-            </a:p>
-          </p:txBody>
-        </p:sp>
-      </p:grpSp>
+          <a:prstGeom prst="rect">
+            <a:avLst/>
+          </a:prstGeom>
+          <a:noFill/>
+        </p:spPr>
+        <p:txBody>
+          <a:bodyPr wrap="square" rtlCol="0">
+            <a:spAutoFit/>
+          </a:bodyPr>
+          <a:lstStyle/>
+          <a:p>
+            <a:pPr algn="ctr"/>
+            <a:r>
+              <a:rPr lang="en-GB" dirty="0"/>
+              <a:t>Rating scale you will see during the rating</a:t>
+            </a:r>
+          </a:p>
+        </p:txBody>
+      </p:sp>
+      <p:pic>
+        <p:nvPicPr>
+          <p:cNvPr id="19" name="Picture 18">
+            <a:extLst>
+              <a:ext uri="{FF2B5EF4-FFF2-40B4-BE49-F238E27FC236}">
+                <a16:creationId xmlns:a16="http://schemas.microsoft.com/office/drawing/2014/main" id="{E7E0EAEB-5853-4612-8A5B-86596A0DE654}"/>
+              </a:ext>
+            </a:extLst>
+          </p:cNvPr>
+          <p:cNvPicPr>
+            <a:picLocks noChangeAspect="1"/>
+          </p:cNvPicPr>
+          <p:nvPr/>
+        </p:nvPicPr>
+        <p:blipFill>
+          <a:blip r:embed="rId2"/>
+          <a:stretch>
+            <a:fillRect/>
+          </a:stretch>
+        </p:blipFill>
+        <p:spPr>
+          <a:xfrm>
+            <a:off x="8157608" y="608110"/>
+            <a:ext cx="3474219" cy="2305549"/>
+          </a:xfrm>
+          <a:prstGeom prst="rect">
+            <a:avLst/>
+          </a:prstGeom>
+        </p:spPr>
+      </p:pic>
+      <p:sp>
+        <p:nvSpPr>
+          <p:cNvPr id="16" name="TextBox 15">
+            <a:extLst>
+              <a:ext uri="{FF2B5EF4-FFF2-40B4-BE49-F238E27FC236}">
+                <a16:creationId xmlns:a16="http://schemas.microsoft.com/office/drawing/2014/main" id="{0C50E299-F62F-5799-1C7C-FDCA857E9A62}"/>
+              </a:ext>
+            </a:extLst>
+          </p:cNvPr>
+          <p:cNvSpPr txBox="1"/>
+          <p:nvPr/>
+        </p:nvSpPr>
+        <p:spPr>
+          <a:xfrm>
+            <a:off x="8440233" y="2958031"/>
+            <a:ext cx="2736574" cy="646331"/>
+          </a:xfrm>
+          <a:prstGeom prst="rect">
+            <a:avLst/>
+          </a:prstGeom>
+          <a:noFill/>
+        </p:spPr>
+        <p:txBody>
+          <a:bodyPr wrap="square" rtlCol="0">
+            <a:spAutoFit/>
+          </a:bodyPr>
+          <a:lstStyle/>
+          <a:p>
+            <a:pPr algn="ctr"/>
+            <a:r>
+              <a:rPr lang="da-DK" dirty="0" err="1"/>
+              <a:t>LabBench</a:t>
+            </a:r>
+            <a:r>
+              <a:rPr lang="da-DK" dirty="0"/>
+              <a:t> </a:t>
+            </a:r>
+            <a:r>
+              <a:rPr lang="da-DK" dirty="0" err="1"/>
+              <a:t>Scale</a:t>
+            </a:r>
+            <a:r>
+              <a:rPr lang="da-DK" dirty="0"/>
+              <a:t> </a:t>
+            </a:r>
+            <a:r>
+              <a:rPr lang="da-DK" dirty="0" err="1"/>
+              <a:t>you</a:t>
+            </a:r>
+            <a:r>
+              <a:rPr lang="da-DK" dirty="0"/>
+              <a:t> will </a:t>
+            </a:r>
+            <a:r>
+              <a:rPr lang="da-DK" dirty="0" err="1"/>
+              <a:t>use</a:t>
+            </a:r>
+            <a:r>
+              <a:rPr lang="da-DK" dirty="0"/>
+              <a:t> for the ratings.</a:t>
+            </a:r>
+            <a:endParaRPr lang="en-US" dirty="0"/>
+          </a:p>
+        </p:txBody>
+      </p:sp>
+      <p:sp>
+        <p:nvSpPr>
+          <p:cNvPr id="20" name="TextBox 19">
+            <a:extLst>
+              <a:ext uri="{FF2B5EF4-FFF2-40B4-BE49-F238E27FC236}">
+                <a16:creationId xmlns:a16="http://schemas.microsoft.com/office/drawing/2014/main" id="{223D1ABB-8D77-3FC5-D0E5-DF62E4F2E04E}"/>
+              </a:ext>
+            </a:extLst>
+          </p:cNvPr>
+          <p:cNvSpPr txBox="1"/>
+          <p:nvPr/>
+        </p:nvSpPr>
+        <p:spPr>
+          <a:xfrm>
+            <a:off x="8647043" y="262759"/>
+            <a:ext cx="3150794" cy="646331"/>
+          </a:xfrm>
+          <a:prstGeom prst="rect">
+            <a:avLst/>
+          </a:prstGeom>
+          <a:noFill/>
+        </p:spPr>
+        <p:txBody>
+          <a:bodyPr wrap="square" rtlCol="0">
+            <a:spAutoFit/>
+          </a:bodyPr>
+          <a:lstStyle/>
+          <a:p>
+            <a:pPr algn="ctr"/>
+            <a:r>
+              <a:rPr lang="da-DK" dirty="0" err="1"/>
+              <a:t>horizontal</a:t>
+            </a:r>
+            <a:r>
+              <a:rPr lang="da-DK" dirty="0"/>
+              <a:t> </a:t>
+            </a:r>
+            <a:r>
+              <a:rPr lang="da-DK" dirty="0" err="1"/>
+              <a:t>scroll</a:t>
+            </a:r>
+            <a:r>
+              <a:rPr lang="da-DK" dirty="0"/>
+              <a:t> bar </a:t>
+            </a:r>
+            <a:r>
+              <a:rPr lang="da-DK" dirty="0" err="1"/>
+              <a:t>you</a:t>
+            </a:r>
+            <a:r>
+              <a:rPr lang="da-DK" dirty="0"/>
+              <a:t> will </a:t>
+            </a:r>
+            <a:r>
+              <a:rPr lang="da-DK" dirty="0" err="1"/>
+              <a:t>use</a:t>
+            </a:r>
+            <a:r>
+              <a:rPr lang="da-DK" dirty="0"/>
+              <a:t> for the ratings.</a:t>
+            </a:r>
+            <a:endParaRPr lang="en-US" dirty="0"/>
+          </a:p>
+        </p:txBody>
+      </p:sp>
+      <p:cxnSp>
+        <p:nvCxnSpPr>
+          <p:cNvPr id="22" name="Straight Arrow Connector 21">
+            <a:extLst>
+              <a:ext uri="{FF2B5EF4-FFF2-40B4-BE49-F238E27FC236}">
+                <a16:creationId xmlns:a16="http://schemas.microsoft.com/office/drawing/2014/main" id="{D6BF8C15-71FD-1D52-F517-93CBEF1965D9}"/>
+              </a:ext>
+            </a:extLst>
+          </p:cNvPr>
+          <p:cNvCxnSpPr>
+            <a:cxnSpLocks/>
+            <a:stCxn id="20" idx="2"/>
+          </p:cNvCxnSpPr>
+          <p:nvPr/>
+        </p:nvCxnSpPr>
+        <p:spPr>
+          <a:xfrm flipH="1">
+            <a:off x="9808520" y="909090"/>
+            <a:ext cx="413920" cy="553021"/>
+          </a:xfrm>
+          <a:prstGeom prst="straightConnector1">
+            <a:avLst/>
+          </a:prstGeom>
+          <a:ln>
+            <a:tailEnd type="triangle"/>
+          </a:ln>
+        </p:spPr>
+        <p:style>
+          <a:lnRef idx="3">
+            <a:schemeClr val="dk1"/>
+          </a:lnRef>
+          <a:fillRef idx="0">
+            <a:schemeClr val="dk1"/>
+          </a:fillRef>
+          <a:effectRef idx="2">
+            <a:schemeClr val="dk1"/>
+          </a:effectRef>
+          <a:fontRef idx="minor">
+            <a:schemeClr val="tx1"/>
+          </a:fontRef>
+        </p:style>
+      </p:cxnSp>
+      <p:pic>
+        <p:nvPicPr>
+          <p:cNvPr id="27" name="Picture 26" descr="A screenshot of a computer&#10;&#10;Description automatically generated">
+            <a:extLst>
+              <a:ext uri="{FF2B5EF4-FFF2-40B4-BE49-F238E27FC236}">
+                <a16:creationId xmlns:a16="http://schemas.microsoft.com/office/drawing/2014/main" id="{CDC2F8BB-7BAF-B63E-DCF4-AF8763335523}"/>
+              </a:ext>
+            </a:extLst>
+          </p:cNvPr>
+          <p:cNvPicPr>
+            <a:picLocks noChangeAspect="1"/>
+          </p:cNvPicPr>
+          <p:nvPr/>
+        </p:nvPicPr>
+        <p:blipFill rotWithShape="1">
+          <a:blip r:embed="rId3">
+            <a:extLst>
+              <a:ext uri="{28A0092B-C50C-407E-A947-70E740481C1C}">
+                <a14:useLocalDpi xmlns:a14="http://schemas.microsoft.com/office/drawing/2010/main" val="0"/>
+              </a:ext>
+            </a:extLst>
+          </a:blip>
+          <a:srcRect l="24247" t="43404" r="22997" b="35887"/>
+          <a:stretch/>
+        </p:blipFill>
+        <p:spPr>
+          <a:xfrm>
+            <a:off x="659330" y="1085174"/>
+            <a:ext cx="6120411" cy="1351420"/>
+          </a:xfrm>
+          <a:prstGeom prst="rect">
+            <a:avLst/>
+          </a:prstGeom>
+        </p:spPr>
+      </p:pic>
+      <p:sp>
+        <p:nvSpPr>
+          <p:cNvPr id="28" name="TextBox 27">
+            <a:extLst>
+              <a:ext uri="{FF2B5EF4-FFF2-40B4-BE49-F238E27FC236}">
+                <a16:creationId xmlns:a16="http://schemas.microsoft.com/office/drawing/2014/main" id="{C6AAA644-E584-FB21-170B-90C28D0AD847}"/>
+              </a:ext>
+            </a:extLst>
+          </p:cNvPr>
+          <p:cNvSpPr txBox="1"/>
+          <p:nvPr/>
+        </p:nvSpPr>
+        <p:spPr>
+          <a:xfrm>
+            <a:off x="115769" y="2024741"/>
+            <a:ext cx="673582" cy="246221"/>
+          </a:xfrm>
+          <a:prstGeom prst="rect">
+            <a:avLst/>
+          </a:prstGeom>
+          <a:noFill/>
+        </p:spPr>
+        <p:txBody>
+          <a:bodyPr wrap="none" rtlCol="0">
+            <a:spAutoFit/>
+          </a:bodyPr>
+          <a:lstStyle/>
+          <a:p>
+            <a:r>
+              <a:rPr lang="en-US" sz="1000" dirty="0">
+                <a:latin typeface="Calibri" panose="020F0502020204030204" pitchFamily="34" charset="0"/>
+                <a:cs typeface="Calibri" panose="020F0502020204030204" pitchFamily="34" charset="0"/>
+              </a:rPr>
+              <a:t>0/No itch</a:t>
+            </a:r>
+          </a:p>
+        </p:txBody>
+      </p:sp>
+      <p:sp>
+        <p:nvSpPr>
+          <p:cNvPr id="29" name="TextBox 28">
+            <a:extLst>
+              <a:ext uri="{FF2B5EF4-FFF2-40B4-BE49-F238E27FC236}">
+                <a16:creationId xmlns:a16="http://schemas.microsoft.com/office/drawing/2014/main" id="{2570535F-EC61-0C4D-4F3F-C2778DB15793}"/>
+              </a:ext>
+            </a:extLst>
+          </p:cNvPr>
+          <p:cNvSpPr txBox="1"/>
+          <p:nvPr/>
+        </p:nvSpPr>
+        <p:spPr>
+          <a:xfrm>
+            <a:off x="6353859" y="2075291"/>
+            <a:ext cx="1564852" cy="246221"/>
+          </a:xfrm>
+          <a:prstGeom prst="rect">
+            <a:avLst/>
+          </a:prstGeom>
+          <a:noFill/>
+        </p:spPr>
+        <p:txBody>
+          <a:bodyPr wrap="none" rtlCol="0">
+            <a:spAutoFit/>
+          </a:bodyPr>
+          <a:lstStyle/>
+          <a:p>
+            <a:r>
+              <a:rPr lang="en-US" sz="1000" dirty="0">
+                <a:latin typeface="Calibri" panose="020F0502020204030204" pitchFamily="34" charset="0"/>
+                <a:cs typeface="Calibri" panose="020F0502020204030204" pitchFamily="34" charset="0"/>
+              </a:rPr>
+              <a:t>10/Worst imaginable itch</a:t>
+            </a:r>
+          </a:p>
+        </p:txBody>
+      </p:sp>
     </p:spTree>
     <p:extLst>
       <p:ext uri="{BB962C8B-B14F-4D97-AF65-F5344CB8AC3E}">
@@ -3852,8 +3780,8 @@
         </p:nvSpPr>
         <p:spPr>
           <a:xfrm>
-            <a:off x="2938379" y="3552939"/>
-            <a:ext cx="6164572" cy="646331"/>
+            <a:off x="848139" y="4772136"/>
+            <a:ext cx="10363200" cy="1384995"/>
           </a:xfrm>
           <a:prstGeom prst="rect">
             <a:avLst/>
@@ -3861,14 +3789,21 @@
           <a:noFill/>
         </p:spPr>
         <p:txBody>
-          <a:bodyPr wrap="none" rtlCol="0">
+          <a:bodyPr wrap="square" rtlCol="0">
             <a:spAutoFit/>
           </a:bodyPr>
           <a:lstStyle/>
           <a:p>
-            <a:pPr algn="ctr"/>
-            <a:r>
-              <a:rPr lang="en-US" sz="1800" dirty="0">
+            <a:pPr algn="just"/>
+            <a:r>
+              <a:rPr lang="en-US" sz="2800" dirty="0">
+                <a:latin typeface="Calibri" panose="020F0502020204030204" pitchFamily="34" charset="0"/>
+                <a:cs typeface="Calibri" panose="020F0502020204030204" pitchFamily="34" charset="0"/>
+              </a:rPr>
+              <a:t>You will use a scale ranging from 0 (no itch) to 10 (worse imaginable itch). </a:t>
+            </a:r>
+            <a:r>
+              <a:rPr lang="en-US" sz="2800" dirty="0">
                 <a:effectLst/>
                 <a:latin typeface="Calibri" panose="020F0502020204030204" pitchFamily="34" charset="0"/>
                 <a:ea typeface="Times New Roman" panose="02020603050405020304" pitchFamily="18" charset="0"/>
@@ -3877,273 +3812,226 @@
             </a:r>
           </a:p>
           <a:p>
-            <a:pPr algn="ctr"/>
-            <a:r>
-              <a:rPr lang="en-US" sz="1800" dirty="0">
+            <a:pPr algn="just"/>
+            <a:r>
+              <a:rPr lang="en-US" sz="2800" dirty="0">
                 <a:effectLst/>
                 <a:latin typeface="Calibri" panose="020F0502020204030204" pitchFamily="34" charset="0"/>
                 <a:ea typeface="Times New Roman" panose="02020603050405020304" pitchFamily="18" charset="0"/>
               </a:rPr>
               <a:t>on the scale that corresponds to your feeling. </a:t>
             </a:r>
+            <a:endParaRPr lang="en-US" sz="2800" dirty="0"/>
+          </a:p>
+        </p:txBody>
+      </p:sp>
+      <p:pic>
+        <p:nvPicPr>
+          <p:cNvPr id="12" name="Picture 11">
+            <a:extLst>
+              <a:ext uri="{FF2B5EF4-FFF2-40B4-BE49-F238E27FC236}">
+                <a16:creationId xmlns:a16="http://schemas.microsoft.com/office/drawing/2014/main" id="{907980E8-C56D-5673-D2DF-1E3E2C97AD70}"/>
+              </a:ext>
+            </a:extLst>
+          </p:cNvPr>
+          <p:cNvPicPr>
+            <a:picLocks noChangeAspect="1"/>
+          </p:cNvPicPr>
+          <p:nvPr/>
+        </p:nvPicPr>
+        <p:blipFill>
+          <a:blip r:embed="rId2"/>
+          <a:stretch>
+            <a:fillRect/>
+          </a:stretch>
+        </p:blipFill>
+        <p:spPr>
+          <a:xfrm>
+            <a:off x="1396278" y="1298591"/>
+            <a:ext cx="3434688" cy="2362319"/>
+          </a:xfrm>
+          <a:prstGeom prst="rect">
+            <a:avLst/>
+          </a:prstGeom>
+        </p:spPr>
+      </p:pic>
+      <p:sp>
+        <p:nvSpPr>
+          <p:cNvPr id="15" name="TextBox 14">
+            <a:extLst>
+              <a:ext uri="{FF2B5EF4-FFF2-40B4-BE49-F238E27FC236}">
+                <a16:creationId xmlns:a16="http://schemas.microsoft.com/office/drawing/2014/main" id="{7D9AAC15-B247-83DD-FD52-CF52DD45FE3A}"/>
+              </a:ext>
+            </a:extLst>
+          </p:cNvPr>
+          <p:cNvSpPr txBox="1"/>
+          <p:nvPr/>
+        </p:nvSpPr>
+        <p:spPr>
+          <a:xfrm>
+            <a:off x="6663995" y="3133978"/>
+            <a:ext cx="3073549" cy="646331"/>
+          </a:xfrm>
+          <a:prstGeom prst="rect">
+            <a:avLst/>
+          </a:prstGeom>
+          <a:noFill/>
+        </p:spPr>
+        <p:txBody>
+          <a:bodyPr wrap="square" rtlCol="0">
+            <a:spAutoFit/>
+          </a:bodyPr>
+          <a:lstStyle/>
+          <a:p>
+            <a:pPr algn="ctr"/>
+            <a:r>
+              <a:rPr lang="da-DK" dirty="0"/>
+              <a:t>Rating </a:t>
+            </a:r>
+            <a:r>
+              <a:rPr lang="da-DK" dirty="0" err="1"/>
+              <a:t>scale</a:t>
+            </a:r>
+            <a:r>
+              <a:rPr lang="da-DK" dirty="0"/>
+              <a:t> </a:t>
+            </a:r>
+            <a:r>
+              <a:rPr lang="da-DK" dirty="0" err="1"/>
+              <a:t>you</a:t>
+            </a:r>
+            <a:r>
+              <a:rPr lang="da-DK" dirty="0"/>
+              <a:t> will </a:t>
+            </a:r>
+            <a:r>
+              <a:rPr lang="da-DK" dirty="0" err="1"/>
+              <a:t>see</a:t>
+            </a:r>
+            <a:r>
+              <a:rPr lang="da-DK" dirty="0"/>
+              <a:t> </a:t>
+            </a:r>
+            <a:r>
+              <a:rPr lang="da-DK" dirty="0" err="1"/>
+              <a:t>during</a:t>
+            </a:r>
+            <a:r>
+              <a:rPr lang="da-DK" dirty="0"/>
+              <a:t> the rating</a:t>
+            </a:r>
             <a:endParaRPr lang="en-US" dirty="0"/>
           </a:p>
         </p:txBody>
       </p:sp>
-      <p:grpSp>
-        <p:nvGrpSpPr>
-          <p:cNvPr id="17" name="Group 16">
-            <a:extLst>
-              <a:ext uri="{FF2B5EF4-FFF2-40B4-BE49-F238E27FC236}">
-                <a16:creationId xmlns:a16="http://schemas.microsoft.com/office/drawing/2014/main" id="{13BCEB1E-6B96-6EA4-C1E5-F18E6CD7F3A1}"/>
-              </a:ext>
-            </a:extLst>
-          </p:cNvPr>
-          <p:cNvGrpSpPr/>
+      <p:pic>
+        <p:nvPicPr>
+          <p:cNvPr id="16" name="Picture 15">
+            <a:extLst>
+              <a:ext uri="{FF2B5EF4-FFF2-40B4-BE49-F238E27FC236}">
+                <a16:creationId xmlns:a16="http://schemas.microsoft.com/office/drawing/2014/main" id="{EA10FBD3-0508-BF8F-0859-1B11F7D9567C}"/>
+              </a:ext>
+            </a:extLst>
+          </p:cNvPr>
+          <p:cNvPicPr>
+            <a:picLocks noChangeAspect="1"/>
+          </p:cNvPicPr>
           <p:nvPr/>
-        </p:nvGrpSpPr>
-        <p:grpSpPr>
+        </p:nvPicPr>
+        <p:blipFill>
+          <a:blip r:embed="rId3"/>
+          <a:stretch>
+            <a:fillRect/>
+          </a:stretch>
+        </p:blipFill>
+        <p:spPr>
           <a:xfrm>
-            <a:off x="1442660" y="1066681"/>
-            <a:ext cx="10219695" cy="2362319"/>
-            <a:chOff x="1442660" y="1066681"/>
-            <a:chExt cx="10219695" cy="2362319"/>
+            <a:off x="4739183" y="1529423"/>
+            <a:ext cx="6923172" cy="1574866"/>
           </a:xfrm>
-        </p:grpSpPr>
-        <p:pic>
-          <p:nvPicPr>
-            <p:cNvPr id="12" name="Picture 11">
-              <a:extLst>
-                <a:ext uri="{FF2B5EF4-FFF2-40B4-BE49-F238E27FC236}">
-                  <a16:creationId xmlns:a16="http://schemas.microsoft.com/office/drawing/2014/main" id="{907980E8-C56D-5673-D2DF-1E3E2C97AD70}"/>
-                </a:ext>
-              </a:extLst>
-            </p:cNvPr>
-            <p:cNvPicPr>
-              <a:picLocks noChangeAspect="1"/>
-            </p:cNvPicPr>
-            <p:nvPr/>
-          </p:nvPicPr>
-          <p:blipFill>
-            <a:blip r:embed="rId2"/>
-            <a:stretch>
-              <a:fillRect/>
-            </a:stretch>
-          </p:blipFill>
-          <p:spPr>
-            <a:xfrm>
-              <a:off x="1442660" y="1066681"/>
-              <a:ext cx="3434688" cy="2362319"/>
-            </a:xfrm>
-            <a:prstGeom prst="rect">
-              <a:avLst/>
-            </a:prstGeom>
-          </p:spPr>
-        </p:pic>
-        <p:sp>
-          <p:nvSpPr>
-            <p:cNvPr id="13" name="TextBox 12">
-              <a:extLst>
-                <a:ext uri="{FF2B5EF4-FFF2-40B4-BE49-F238E27FC236}">
-                  <a16:creationId xmlns:a16="http://schemas.microsoft.com/office/drawing/2014/main" id="{133F28D6-B16C-8695-1B52-D8C551C184FA}"/>
-                </a:ext>
-              </a:extLst>
-            </p:cNvPr>
-            <p:cNvSpPr txBox="1"/>
-            <p:nvPr/>
-          </p:nvSpPr>
-          <p:spPr>
-            <a:xfrm>
-              <a:off x="2938379" y="1066681"/>
-              <a:ext cx="2049137" cy="461665"/>
-            </a:xfrm>
-            <a:prstGeom prst="rect">
-              <a:avLst/>
-            </a:prstGeom>
-            <a:noFill/>
-          </p:spPr>
-          <p:txBody>
-            <a:bodyPr wrap="square" rtlCol="0">
-              <a:spAutoFit/>
-            </a:bodyPr>
-            <a:lstStyle/>
-            <a:p>
-              <a:pPr algn="ctr"/>
-              <a:r>
-                <a:rPr lang="da-DK" sz="1200" dirty="0" err="1"/>
-                <a:t>Orizontal</a:t>
-              </a:r>
-              <a:r>
-                <a:rPr lang="da-DK" sz="1200" dirty="0"/>
-                <a:t> </a:t>
-              </a:r>
-              <a:r>
-                <a:rPr lang="da-DK" sz="1200" dirty="0" err="1"/>
-                <a:t>scroll</a:t>
-              </a:r>
-              <a:r>
-                <a:rPr lang="da-DK" sz="1200" dirty="0"/>
-                <a:t> bar </a:t>
-              </a:r>
-              <a:r>
-                <a:rPr lang="da-DK" sz="1200" dirty="0" err="1"/>
-                <a:t>you</a:t>
-              </a:r>
-              <a:r>
-                <a:rPr lang="da-DK" sz="1200" dirty="0"/>
-                <a:t> will </a:t>
-              </a:r>
-              <a:r>
-                <a:rPr lang="da-DK" sz="1200" dirty="0" err="1"/>
-                <a:t>use</a:t>
-              </a:r>
-              <a:r>
-                <a:rPr lang="da-DK" sz="1200" dirty="0"/>
-                <a:t> for the ratings.</a:t>
-              </a:r>
-              <a:endParaRPr lang="en-US" sz="1200" dirty="0"/>
-            </a:p>
-          </p:txBody>
-        </p:sp>
-        <p:cxnSp>
-          <p:nvCxnSpPr>
-            <p:cNvPr id="14" name="Straight Arrow Connector 13">
-              <a:extLst>
-                <a:ext uri="{FF2B5EF4-FFF2-40B4-BE49-F238E27FC236}">
-                  <a16:creationId xmlns:a16="http://schemas.microsoft.com/office/drawing/2014/main" id="{C982665D-8E50-EC19-6798-7F09903F0E05}"/>
-                </a:ext>
-              </a:extLst>
-            </p:cNvPr>
-            <p:cNvCxnSpPr/>
-            <p:nvPr/>
-          </p:nvCxnSpPr>
-          <p:spPr>
-            <a:xfrm flipH="1">
-              <a:off x="3160004" y="1608864"/>
-              <a:ext cx="637690" cy="330506"/>
-            </a:xfrm>
-            <a:prstGeom prst="straightConnector1">
-              <a:avLst/>
-            </a:prstGeom>
-            <a:ln>
-              <a:tailEnd type="triangle"/>
-            </a:ln>
-          </p:spPr>
-          <p:style>
-            <a:lnRef idx="1">
-              <a:schemeClr val="dk1"/>
-            </a:lnRef>
-            <a:fillRef idx="0">
-              <a:schemeClr val="dk1"/>
-            </a:fillRef>
-            <a:effectRef idx="0">
-              <a:schemeClr val="dk1"/>
-            </a:effectRef>
-            <a:fontRef idx="minor">
-              <a:schemeClr val="tx1"/>
-            </a:fontRef>
-          </p:style>
-        </p:cxnSp>
-        <p:sp>
-          <p:nvSpPr>
-            <p:cNvPr id="15" name="TextBox 14">
-              <a:extLst>
-                <a:ext uri="{FF2B5EF4-FFF2-40B4-BE49-F238E27FC236}">
-                  <a16:creationId xmlns:a16="http://schemas.microsoft.com/office/drawing/2014/main" id="{7D9AAC15-B247-83DD-FD52-CF52DD45FE3A}"/>
-                </a:ext>
-              </a:extLst>
-            </p:cNvPr>
-            <p:cNvSpPr txBox="1"/>
-            <p:nvPr/>
-          </p:nvSpPr>
-          <p:spPr>
-            <a:xfrm>
-              <a:off x="6663995" y="2902068"/>
-              <a:ext cx="3073549" cy="276999"/>
-            </a:xfrm>
-            <a:prstGeom prst="rect">
-              <a:avLst/>
-            </a:prstGeom>
-            <a:noFill/>
-          </p:spPr>
-          <p:txBody>
-            <a:bodyPr wrap="square" rtlCol="0">
-              <a:spAutoFit/>
-            </a:bodyPr>
-            <a:lstStyle/>
-            <a:p>
-              <a:pPr algn="ctr"/>
-              <a:r>
-                <a:rPr lang="da-DK" sz="1200" dirty="0"/>
-                <a:t>Rating </a:t>
-              </a:r>
-              <a:r>
-                <a:rPr lang="da-DK" sz="1200" dirty="0" err="1"/>
-                <a:t>scale</a:t>
-              </a:r>
-              <a:r>
-                <a:rPr lang="da-DK" sz="1200" dirty="0"/>
-                <a:t> </a:t>
-              </a:r>
-              <a:r>
-                <a:rPr lang="da-DK" sz="1200" dirty="0" err="1"/>
-                <a:t>you</a:t>
-              </a:r>
-              <a:r>
-                <a:rPr lang="da-DK" sz="1200" dirty="0"/>
-                <a:t> will </a:t>
-              </a:r>
-              <a:r>
-                <a:rPr lang="da-DK" sz="1200" dirty="0" err="1"/>
-                <a:t>see</a:t>
-              </a:r>
-              <a:r>
-                <a:rPr lang="da-DK" sz="1200" dirty="0"/>
-                <a:t> </a:t>
-              </a:r>
-              <a:r>
-                <a:rPr lang="da-DK" sz="1200" dirty="0" err="1"/>
-                <a:t>during</a:t>
-              </a:r>
-              <a:r>
-                <a:rPr lang="da-DK" sz="1200" dirty="0"/>
-                <a:t> the rating</a:t>
-              </a:r>
-              <a:endParaRPr lang="en-US" sz="1200" dirty="0"/>
-            </a:p>
-          </p:txBody>
-        </p:sp>
-        <p:pic>
-          <p:nvPicPr>
-            <p:cNvPr id="16" name="Picture 15">
-              <a:extLst>
-                <a:ext uri="{FF2B5EF4-FFF2-40B4-BE49-F238E27FC236}">
-                  <a16:creationId xmlns:a16="http://schemas.microsoft.com/office/drawing/2014/main" id="{EA10FBD3-0508-BF8F-0859-1B11F7D9567C}"/>
-                </a:ext>
-              </a:extLst>
-            </p:cNvPr>
-            <p:cNvPicPr>
-              <a:picLocks noChangeAspect="1"/>
-            </p:cNvPicPr>
-            <p:nvPr/>
-          </p:nvPicPr>
-          <p:blipFill>
-            <a:blip r:embed="rId3"/>
-            <a:stretch>
-              <a:fillRect/>
-            </a:stretch>
-          </p:blipFill>
-          <p:spPr>
-            <a:xfrm>
-              <a:off x="4739183" y="1297513"/>
-              <a:ext cx="6923172" cy="1574866"/>
-            </a:xfrm>
-            <a:prstGeom prst="rect">
-              <a:avLst/>
-            </a:prstGeom>
-          </p:spPr>
-        </p:pic>
-      </p:grpSp>
+          <a:prstGeom prst="rect">
+            <a:avLst/>
+          </a:prstGeom>
+        </p:spPr>
+      </p:pic>
+      <p:sp>
+        <p:nvSpPr>
+          <p:cNvPr id="13" name="TextBox 12">
+            <a:extLst>
+              <a:ext uri="{FF2B5EF4-FFF2-40B4-BE49-F238E27FC236}">
+                <a16:creationId xmlns:a16="http://schemas.microsoft.com/office/drawing/2014/main" id="{133F28D6-B16C-8695-1B52-D8C551C184FA}"/>
+              </a:ext>
+            </a:extLst>
+          </p:cNvPr>
+          <p:cNvSpPr txBox="1"/>
+          <p:nvPr/>
+        </p:nvSpPr>
+        <p:spPr>
+          <a:xfrm>
+            <a:off x="2891997" y="883092"/>
+            <a:ext cx="2746804" cy="646331"/>
+          </a:xfrm>
+          <a:prstGeom prst="rect">
+            <a:avLst/>
+          </a:prstGeom>
+          <a:noFill/>
+        </p:spPr>
+        <p:txBody>
+          <a:bodyPr wrap="square" rtlCol="0">
+            <a:spAutoFit/>
+          </a:bodyPr>
+          <a:lstStyle/>
+          <a:p>
+            <a:pPr algn="ctr"/>
+            <a:r>
+              <a:rPr lang="en-US" dirty="0"/>
+              <a:t>Horizontal scroll bar you will use for the ratings.</a:t>
+            </a:r>
+          </a:p>
+        </p:txBody>
+      </p:sp>
+      <p:cxnSp>
+        <p:nvCxnSpPr>
+          <p:cNvPr id="4" name="Straight Arrow Connector 3">
+            <a:extLst>
+              <a:ext uri="{FF2B5EF4-FFF2-40B4-BE49-F238E27FC236}">
+                <a16:creationId xmlns:a16="http://schemas.microsoft.com/office/drawing/2014/main" id="{E26939C1-CABA-937F-EAB6-0C58BE4187FF}"/>
+              </a:ext>
+            </a:extLst>
+          </p:cNvPr>
+          <p:cNvCxnSpPr>
+            <a:cxnSpLocks/>
+            <a:stCxn id="13" idx="2"/>
+          </p:cNvCxnSpPr>
+          <p:nvPr/>
+        </p:nvCxnSpPr>
+        <p:spPr>
+          <a:xfrm flipH="1">
+            <a:off x="3154017" y="1529423"/>
+            <a:ext cx="1111382" cy="630681"/>
+          </a:xfrm>
+          <a:prstGeom prst="straightConnector1">
+            <a:avLst/>
+          </a:prstGeom>
+          <a:ln>
+            <a:tailEnd type="triangle"/>
+          </a:ln>
+        </p:spPr>
+        <p:style>
+          <a:lnRef idx="3">
+            <a:schemeClr val="dk1"/>
+          </a:lnRef>
+          <a:fillRef idx="0">
+            <a:schemeClr val="dk1"/>
+          </a:fillRef>
+          <a:effectRef idx="2">
+            <a:schemeClr val="dk1"/>
+          </a:effectRef>
+          <a:fontRef idx="minor">
+            <a:schemeClr val="tx1"/>
+          </a:fontRef>
+        </p:style>
+      </p:cxnSp>
     </p:spTree>
     <p:extLst>
       <p:ext uri="{BB962C8B-B14F-4D97-AF65-F5344CB8AC3E}">

</xml_diff>